<commit_message>
Added layout for sessions
</commit_message>
<xml_diff>
--- a/other/presentation_ukr.pptx
+++ b/other/presentation_ukr.pptx
@@ -228,7 +228,7 @@
           <a:p>
             <a:fld id="{4F903A39-DD76-478C-94C7-86508DFCBF5B}" type="datetimeFigureOut">
               <a:rPr lang="en-US" smtClean="0"/>
-              <a:t>11/7/2022</a:t>
+              <a:t>11/8/2022</a:t>
             </a:fld>
             <a:endParaRPr lang="en-US"/>
           </a:p>
@@ -6265,7 +6265,7 @@
           <p:nvPr>
             <p:extLst>
               <p:ext uri="{D42A27DB-BD31-4B8C-83A1-F6EECF244321}">
-                <p14:modId xmlns:p14="http://schemas.microsoft.com/office/powerpoint/2010/main" val="215990869"/>
+                <p14:modId xmlns:p14="http://schemas.microsoft.com/office/powerpoint/2010/main" val="1128096936"/>
               </p:ext>
             </p:extLst>
           </p:nvPr>
@@ -7188,6 +7188,9 @@
                           <a:schemeClr val="bg1"/>
                         </a:solidFill>
                         <a:effectLst/>
+                        <a:highlight>
+                          <a:srgbClr val="FFFF00"/>
+                        </a:highlight>
                       </a:endParaRPr>
                     </a:p>
                   </a:txBody>
@@ -7228,14 +7231,121 @@
                     <a:p>
                       <a:pPr rtl="0" fontAlgn="ctr"/>
                       <a:r>
-                        <a:rPr lang="ru-RU" sz="1400" b="0">
+                        <a:rPr lang="ru-RU" sz="1400" b="0" dirty="0">
                           <a:solidFill>
                             <a:schemeClr val="bg1"/>
                           </a:solidFill>
                           <a:effectLst/>
+                          <a:highlight>
+                            <a:srgbClr val="FFFF00"/>
+                          </a:highlight>
                           <a:latin typeface="Montserrat" panose="00000500000000000000" pitchFamily="2" charset="0"/>
                         </a:rPr>
-                        <a:t>Шо дали, то маєш, ти обмежений СШІст</a:t>
+                        <a:t>__</a:t>
+                      </a:r>
+                      <a:r>
+                        <a:rPr lang="ru-RU" sz="1400" b="0" dirty="0" err="1">
+                          <a:solidFill>
+                            <a:schemeClr val="bg1"/>
+                          </a:solidFill>
+                          <a:effectLst/>
+                          <a:highlight>
+                            <a:srgbClr val="FFFF00"/>
+                          </a:highlight>
+                          <a:latin typeface="Montserrat" panose="00000500000000000000" pitchFamily="2" charset="0"/>
+                        </a:rPr>
+                        <a:t>неможливість</a:t>
+                      </a:r>
+                      <a:r>
+                        <a:rPr lang="ru-RU" sz="1400" b="0" dirty="0">
+                          <a:solidFill>
+                            <a:schemeClr val="bg1"/>
+                          </a:solidFill>
+                          <a:effectLst/>
+                          <a:highlight>
+                            <a:srgbClr val="FFFF00"/>
+                          </a:highlight>
+                          <a:latin typeface="Montserrat" panose="00000500000000000000" pitchFamily="2" charset="0"/>
+                        </a:rPr>
+                        <a:t> </a:t>
+                      </a:r>
+                      <a:r>
+                        <a:rPr lang="ru-RU" sz="1400" b="0" dirty="0" err="1">
+                          <a:solidFill>
+                            <a:schemeClr val="bg1"/>
+                          </a:solidFill>
+                          <a:effectLst/>
+                          <a:highlight>
+                            <a:srgbClr val="FFFF00"/>
+                          </a:highlight>
+                          <a:latin typeface="Montserrat" panose="00000500000000000000" pitchFamily="2" charset="0"/>
+                        </a:rPr>
+                        <a:t>створення</a:t>
+                      </a:r>
+                      <a:r>
+                        <a:rPr lang="ru-RU" sz="1400" b="0" dirty="0">
+                          <a:solidFill>
+                            <a:schemeClr val="bg1"/>
+                          </a:solidFill>
+                          <a:effectLst/>
+                          <a:highlight>
+                            <a:srgbClr val="FFFF00"/>
+                          </a:highlight>
+                          <a:latin typeface="Montserrat" panose="00000500000000000000" pitchFamily="2" charset="0"/>
+                        </a:rPr>
+                        <a:t> </a:t>
+                      </a:r>
+                      <a:r>
+                        <a:rPr lang="ru-RU" sz="1400" b="0" dirty="0" err="1">
+                          <a:solidFill>
+                            <a:schemeClr val="bg1"/>
+                          </a:solidFill>
+                          <a:effectLst/>
+                          <a:highlight>
+                            <a:srgbClr val="FFFF00"/>
+                          </a:highlight>
+                          <a:latin typeface="Montserrat" panose="00000500000000000000" pitchFamily="2" charset="0"/>
+                        </a:rPr>
+                        <a:t>своїх</a:t>
+                      </a:r>
+                      <a:r>
+                        <a:rPr lang="ru-RU" sz="1400" b="0" dirty="0">
+                          <a:solidFill>
+                            <a:schemeClr val="bg1"/>
+                          </a:solidFill>
+                          <a:effectLst/>
+                          <a:highlight>
+                            <a:srgbClr val="FFFF00"/>
+                          </a:highlight>
+                          <a:latin typeface="Montserrat" panose="00000500000000000000" pitchFamily="2" charset="0"/>
+                        </a:rPr>
+                        <a:t> </a:t>
+                      </a:r>
+                      <a:r>
+                        <a:rPr lang="ru-RU" sz="1400" b="0" dirty="0" err="1">
+                          <a:solidFill>
+                            <a:schemeClr val="bg1"/>
+                          </a:solidFill>
+                          <a:effectLst/>
+                          <a:highlight>
+                            <a:srgbClr val="FFFF00"/>
+                          </a:highlight>
+                          <a:latin typeface="Montserrat" panose="00000500000000000000" pitchFamily="2" charset="0"/>
+                        </a:rPr>
+                        <a:t>тренувань</a:t>
+                      </a:r>
+                      <a:r>
+                        <a:rPr lang="ru-RU" sz="1400" b="0" dirty="0">
+                          <a:solidFill>
+                            <a:schemeClr val="bg1"/>
+                          </a:solidFill>
+                          <a:effectLst/>
+                          <a:highlight>
+                            <a:srgbClr val="FFFF00"/>
+                          </a:highlight>
+                          <a:latin typeface="Montserrat" panose="00000500000000000000" pitchFamily="2" charset="0"/>
+                        </a:rPr>
+                        <a:t>__</a:t>
                       </a:r>
                     </a:p>
                   </a:txBody>
@@ -7282,15 +7392,22 @@
                     <a:p>
                       <a:pPr algn="ctr" rtl="0" fontAlgn="ctr"/>
                       <a:r>
-                        <a:rPr lang="en-US" sz="1400" b="0">
+                        <a:rPr lang="uk-UA" sz="1400" b="0" dirty="0">
                           <a:solidFill>
                             <a:schemeClr val="bg1"/>
                           </a:solidFill>
                           <a:effectLst/>
                           <a:latin typeface="Montserrat" panose="00000500000000000000" pitchFamily="2" charset="0"/>
                         </a:rPr>
-                        <a:t>+</a:t>
+                        <a:t>-</a:t>
                       </a:r>
+                      <a:endParaRPr lang="en-US" sz="1400" b="0" dirty="0">
+                        <a:solidFill>
+                          <a:schemeClr val="bg1"/>
+                        </a:solidFill>
+                        <a:effectLst/>
+                        <a:latin typeface="Montserrat" panose="00000500000000000000" pitchFamily="2" charset="0"/>
+                      </a:endParaRPr>
                     </a:p>
                   </a:txBody>
                   <a:tcPr marL="22860" marR="22860" marT="15240" marB="15240" anchor="ctr">
@@ -11641,6 +11758,15 @@
 </file>
 
 <file path=customXml/item2.xml><?xml version="1.0" encoding="utf-8"?>
+<?mso-contentType ?>
+<FormTemplates xmlns="http://schemas.microsoft.com/sharepoint/v3/contenttype/forms">
+  <Display>DocumentLibraryForm</Display>
+  <Edit>DocumentLibraryForm</Edit>
+  <New>DocumentLibraryForm</New>
+</FormTemplates>
+</file>
+
+<file path=customXml/item3.xml><?xml version="1.0" encoding="utf-8"?>
 <ct:contentTypeSchema xmlns:ct="http://schemas.microsoft.com/office/2006/metadata/contentType" xmlns:ma="http://schemas.microsoft.com/office/2006/metadata/properties/metaAttributes" ct:_="" ma:_="" ma:contentTypeName="Document" ma:contentTypeID="0x010100C15EC3F1E4085147AF86B91601D7D2DB" ma:contentTypeVersion="16" ma:contentTypeDescription="Create a new document." ma:contentTypeScope="" ma:versionID="0a3c63f2f36f47f000e7f3b93ef2f3ed">
   <xsd:schema xmlns:xsd="http://www.w3.org/2001/XMLSchema" xmlns:xs="http://www.w3.org/2001/XMLSchema" xmlns:p="http://schemas.microsoft.com/office/2006/metadata/properties" xmlns:ns2="edea067d-348f-4991-9544-be03e5bf0ea7" xmlns:ns3="6206f58c-cc25-41f2-959a-ad450601fd5d" targetNamespace="http://schemas.microsoft.com/office/2006/metadata/properties" ma:root="true" ma:fieldsID="05c9f5ec058d325ae281cb51ee052f03" ns2:_="" ns3:_="">
     <xsd:import namespace="edea067d-348f-4991-9544-be03e5bf0ea7"/>
@@ -11883,15 +12009,6 @@
 </ct:contentTypeSchema>
 </file>
 
-<file path=customXml/item3.xml><?xml version="1.0" encoding="utf-8"?>
-<?mso-contentType ?>
-<FormTemplates xmlns="http://schemas.microsoft.com/sharepoint/v3/contenttype/forms">
-  <Display>DocumentLibraryForm</Display>
-  <Edit>DocumentLibraryForm</Edit>
-  <New>DocumentLibraryForm</New>
-</FormTemplates>
-</file>
-
 <file path=customXml/itemProps1.xml><?xml version="1.0" encoding="utf-8"?>
 <ds:datastoreItem xmlns:ds="http://schemas.openxmlformats.org/officeDocument/2006/customXml" ds:itemID="{857FD5BF-FD8C-42C9-9879-C8F30827CF6E}">
   <ds:schemaRefs>
@@ -11910,6 +12027,14 @@
 </file>
 
 <file path=customXml/itemProps2.xml><?xml version="1.0" encoding="utf-8"?>
+<ds:datastoreItem xmlns:ds="http://schemas.openxmlformats.org/officeDocument/2006/customXml" ds:itemID="{A8FA170B-460C-419B-8C20-6C8F32E244D0}">
+  <ds:schemaRefs>
+    <ds:schemaRef ds:uri="http://schemas.microsoft.com/sharepoint/v3/contenttype/forms"/>
+  </ds:schemaRefs>
+</ds:datastoreItem>
+</file>
+
+<file path=customXml/itemProps3.xml><?xml version="1.0" encoding="utf-8"?>
 <ds:datastoreItem xmlns:ds="http://schemas.openxmlformats.org/officeDocument/2006/customXml" ds:itemID="{80E2D9B1-87FD-4B12-AE3A-640DCF596A6F}">
   <ds:schemaRefs>
     <ds:schemaRef ds:uri="http://schemas.microsoft.com/office/2006/metadata/contentType"/>
@@ -11926,12 +12051,4 @@
     <ds:schemaRef ds:uri="http://schemas.microsoft.com/internal/obd"/>
   </ds:schemaRefs>
 </ds:datastoreItem>
-</file>
-
-<file path=customXml/itemProps3.xml><?xml version="1.0" encoding="utf-8"?>
-<ds:datastoreItem xmlns:ds="http://schemas.openxmlformats.org/officeDocument/2006/customXml" ds:itemID="{A8FA170B-460C-419B-8C20-6C8F32E244D0}">
-  <ds:schemaRefs>
-    <ds:schemaRef ds:uri="http://schemas.microsoft.com/sharepoint/v3/contenttype/forms"/>
-  </ds:schemaRefs>
-</ds:datastoreItem>
 </file>
</xml_diff>